<commit_message>
Add data processing scripts
</commit_message>
<xml_diff>
--- a/notes/Building model.pptx
+++ b/notes/Building model.pptx
@@ -6,6 +6,7 @@
   </p:sldMasterIdLst>
   <p:sldIdLst>
     <p:sldId id="256" r:id="rId2"/>
+    <p:sldId id="257" r:id="rId3"/>
   </p:sldIdLst>
   <p:sldSz cx="12192000" cy="6858000"/>
   <p:notesSz cx="6858000" cy="9144000"/>
@@ -105,6 +106,16 @@
     </a:lvl9pPr>
   </p:defaultTextStyle>
   <p:extLst>
+    <p:ext uri="{521415D9-36F7-43E2-AB2F-B90AF26B5E84}">
+      <p14:sectionLst xmlns:p14="http://schemas.microsoft.com/office/powerpoint/2010/main">
+        <p14:section name="Untitled Section" id="{1D6593AB-E98B-1649-93C2-6F6F810A64E5}">
+          <p14:sldIdLst>
+            <p14:sldId id="256"/>
+            <p14:sldId id="257"/>
+          </p14:sldIdLst>
+        </p14:section>
+      </p14:sectionLst>
+    </p:ext>
     <p:ext uri="{EFAFB233-063F-42B5-8137-9DF3F51BA10A}">
       <p15:sldGuideLst xmlns:p15="http://schemas.microsoft.com/office/powerpoint/2012/main"/>
     </p:ext>
@@ -3347,43 +3358,8 @@
           <a:chExt cx="0" cy="0"/>
         </a:xfrm>
       </p:grpSpPr>
-      <p:sp>
-        <p:nvSpPr>
-          <p:cNvPr id="4" name="TextBox 3">
-            <a:extLst>
-              <a:ext uri="{FF2B5EF4-FFF2-40B4-BE49-F238E27FC236}">
-                <a16:creationId xmlns:a16="http://schemas.microsoft.com/office/drawing/2014/main" id="{312B6BEE-E6FC-D2D4-BF43-2C53600568F1}"/>
-              </a:ext>
-            </a:extLst>
-          </p:cNvPr>
-          <p:cNvSpPr txBox="1"/>
-          <p:nvPr/>
-        </p:nvSpPr>
-        <p:spPr>
-          <a:xfrm>
-            <a:off x="1262742" y="468086"/>
-            <a:ext cx="2873829" cy="369332"/>
-          </a:xfrm>
-          <a:prstGeom prst="rect">
-            <a:avLst/>
-          </a:prstGeom>
-          <a:noFill/>
-        </p:spPr>
-        <p:txBody>
-          <a:bodyPr wrap="square" rtlCol="0">
-            <a:spAutoFit/>
-          </a:bodyPr>
-          <a:lstStyle/>
-          <a:p>
-            <a:r>
-              <a:rPr lang="en-DE" dirty="0"/>
-              <a:t>Input:</a:t>
-            </a:r>
-          </a:p>
-        </p:txBody>
-      </p:sp>
-      <mc:AlternateContent xmlns:mc="http://schemas.openxmlformats.org/markup-compatibility/2006" xmlns:a14="http://schemas.microsoft.com/office/drawing/2010/main">
-        <mc:Choice Requires="a14">
+      <mc:AlternateContent xmlns:mc="http://schemas.openxmlformats.org/markup-compatibility/2006">
+        <mc:Choice xmlns:a14="http://schemas.microsoft.com/office/drawing/2010/main" Requires="a14">
           <p:sp>
             <p:nvSpPr>
               <p:cNvPr id="6" name="TextBox 5">
@@ -3398,7 +3374,7 @@
             </p:nvSpPr>
             <p:spPr>
               <a:xfrm>
-                <a:off x="0" y="1085019"/>
+                <a:off x="7306126" y="2841057"/>
                 <a:ext cx="3442949" cy="963662"/>
               </a:xfrm>
               <a:prstGeom prst="rect">
@@ -3582,7 +3558,7 @@
             </p:txBody>
           </p:sp>
         </mc:Choice>
-        <mc:Fallback xmlns="">
+        <mc:Fallback>
           <p:sp>
             <p:nvSpPr>
               <p:cNvPr id="6" name="TextBox 5">
@@ -3599,7 +3575,7 @@
             </p:nvSpPr>
             <p:spPr>
               <a:xfrm>
-                <a:off x="0" y="1085019"/>
+                <a:off x="7306126" y="2841057"/>
                 <a:ext cx="3442949" cy="963662"/>
               </a:xfrm>
               <a:prstGeom prst="rect">
@@ -3608,7 +3584,7 @@
               <a:blipFill>
                 <a:blip r:embed="rId2"/>
                 <a:stretch>
-                  <a:fillRect t="-1299" b="-6494"/>
+                  <a:fillRect b="-6494"/>
                 </a:stretch>
               </a:blipFill>
             </p:spPr>
@@ -3641,7 +3617,7 @@
         </p:nvSpPr>
         <p:spPr>
           <a:xfrm>
-            <a:off x="1262742" y="2209196"/>
+            <a:off x="5006027" y="2923428"/>
             <a:ext cx="1295399" cy="369332"/>
           </a:xfrm>
           <a:prstGeom prst="rect">
@@ -3656,11 +3632,7 @@
           <a:lstStyle/>
           <a:p>
             <a:r>
-              <a:rPr lang="en-DE" dirty="0">
-                <a:solidFill>
-                  <a:srgbClr val="FF0000"/>
-                </a:solidFill>
-              </a:rPr>
+              <a:rPr lang="en-DE" dirty="0"/>
               <a:t>A     G   T</a:t>
             </a:r>
           </a:p>
@@ -3668,10 +3640,10 @@
       </p:sp>
       <p:sp>
         <p:nvSpPr>
-          <p:cNvPr id="3" name="TextBox 2">
-            <a:extLst>
-              <a:ext uri="{FF2B5EF4-FFF2-40B4-BE49-F238E27FC236}">
-                <a16:creationId xmlns:a16="http://schemas.microsoft.com/office/drawing/2014/main" id="{710AFB88-7F02-70A3-0E5A-1AE6F1DAAE6E}"/>
+          <p:cNvPr id="5" name="TextBox 4">
+            <a:extLst>
+              <a:ext uri="{FF2B5EF4-FFF2-40B4-BE49-F238E27FC236}">
+                <a16:creationId xmlns:a16="http://schemas.microsoft.com/office/drawing/2014/main" id="{92464F46-07D0-B24C-C9F7-8C241D812DAF}"/>
               </a:ext>
             </a:extLst>
           </p:cNvPr>
@@ -3680,8 +3652,8 @@
         </p:nvSpPr>
         <p:spPr>
           <a:xfrm>
-            <a:off x="2710540" y="468086"/>
-            <a:ext cx="4920345" cy="2308324"/>
+            <a:off x="290484" y="2455173"/>
+            <a:ext cx="1586590" cy="369332"/>
           </a:xfrm>
           <a:prstGeom prst="rect">
             <a:avLst/>
@@ -3695,58 +3667,222 @@
           <a:lstStyle/>
           <a:p>
             <a:r>
+              <a:rPr lang="en-GB" dirty="0"/>
+              <a:t>F</a:t>
+            </a:r>
+            <a:r>
               <a:rPr lang="en-DE" dirty="0"/>
-              <a:t>Which input sequence are we interested in?</a:t>
-            </a:r>
-          </a:p>
-          <a:p>
-            <a:endParaRPr lang="en-DE" dirty="0"/>
-          </a:p>
-          <a:p>
-            <a:pPr marL="285750" indent="-285750">
-              <a:buFont typeface="Wingdings" pitchFamily="2" charset="2"/>
-              <a:buChar char="è"/>
-            </a:pPr>
-            <a:r>
-              <a:rPr lang="en-DE" dirty="0"/>
-              <a:t>Sequence of ATAC peaks </a:t>
-            </a:r>
-          </a:p>
-          <a:p>
-            <a:pPr marL="285750" indent="-285750">
-              <a:buFont typeface="Wingdings" pitchFamily="2" charset="2"/>
-              <a:buChar char="è"/>
-            </a:pPr>
-            <a:r>
-              <a:rPr lang="en-DE" dirty="0"/>
-              <a:t>Random sequences across genome (will we not learn nothing or noise from those? Should not predict tracks or will learn noise)</a:t>
-            </a:r>
-          </a:p>
-          <a:p>
-            <a:pPr marL="285750" indent="-285750">
-              <a:buFont typeface="Wingdings" pitchFamily="2" charset="2"/>
-              <a:buChar char="è"/>
-            </a:pPr>
-            <a:r>
-              <a:rPr lang="en-DE" dirty="0"/>
-              <a:t>Sequence around particular genomic regions</a:t>
-            </a:r>
-          </a:p>
-          <a:p>
-            <a:pPr marL="285750" indent="-285750">
-              <a:buFont typeface="Wingdings" pitchFamily="2" charset="2"/>
-              <a:buChar char="è"/>
-            </a:pPr>
-            <a:endParaRPr lang="en-DE" dirty="0"/>
-          </a:p>
-        </p:txBody>
-      </p:sp>
-      <p:sp>
-        <p:nvSpPr>
-          <p:cNvPr id="5" name="TextBox 4">
-            <a:extLst>
-              <a:ext uri="{FF2B5EF4-FFF2-40B4-BE49-F238E27FC236}">
-                <a16:creationId xmlns:a16="http://schemas.microsoft.com/office/drawing/2014/main" id="{92464F46-07D0-B24C-C9F7-8C241D812DAF}"/>
+              <a:t>or each peak</a:t>
+            </a:r>
+          </a:p>
+        </p:txBody>
+      </p:sp>
+      <mc:AlternateContent xmlns:mc="http://schemas.openxmlformats.org/markup-compatibility/2006">
+        <mc:Choice xmlns:a14="http://schemas.microsoft.com/office/drawing/2010/main" Requires="a14">
+          <p:sp>
+            <p:nvSpPr>
+              <p:cNvPr id="10" name="TextBox 9">
+                <a:extLst>
+                  <a:ext uri="{FF2B5EF4-FFF2-40B4-BE49-F238E27FC236}">
+                    <a16:creationId xmlns:a16="http://schemas.microsoft.com/office/drawing/2014/main" id="{28C36B4C-18B2-29B8-1205-79A060B5F691}"/>
+                  </a:ext>
+                </a:extLst>
+              </p:cNvPr>
+              <p:cNvSpPr txBox="1"/>
+              <p:nvPr/>
+            </p:nvSpPr>
+            <p:spPr>
+              <a:xfrm>
+                <a:off x="962116" y="995975"/>
+                <a:ext cx="2056657" cy="732573"/>
+              </a:xfrm>
+              <a:prstGeom prst="rect">
+                <a:avLst/>
+              </a:prstGeom>
+              <a:noFill/>
+            </p:spPr>
+            <p:txBody>
+              <a:bodyPr wrap="square" lIns="0" tIns="0" rIns="0" bIns="0" rtlCol="0">
+                <a:spAutoFit/>
+              </a:bodyPr>
+              <a:lstStyle/>
+              <a:p>
+                <a14:m>
+                  <m:oMathPara xmlns:m="http://schemas.openxmlformats.org/officeDocument/2006/math">
+                    <m:oMathParaPr>
+                      <m:jc m:val="centerGroup"/>
+                    </m:oMathParaPr>
+                    <m:oMath xmlns:m="http://schemas.openxmlformats.org/officeDocument/2006/math">
+                      <m:d>
+                        <m:dPr>
+                          <m:begChr m:val="["/>
+                          <m:endChr m:val="]"/>
+                          <m:ctrlPr>
+                            <a:rPr lang="en-DE" i="1" smtClean="0">
+                              <a:latin typeface="Cambria Math" panose="02040503050406030204" pitchFamily="18" charset="0"/>
+                            </a:rPr>
+                          </m:ctrlPr>
+                        </m:dPr>
+                        <m:e>
+                          <m:m>
+                            <m:mPr>
+                              <m:mcs>
+                                <m:mc>
+                                  <m:mcPr>
+                                    <m:count m:val="3"/>
+                                    <m:mcJc m:val="center"/>
+                                  </m:mcPr>
+                                </m:mc>
+                              </m:mcs>
+                              <m:ctrlPr>
+                                <a:rPr lang="en-DE" i="1" smtClean="0">
+                                  <a:latin typeface="Cambria Math" panose="02040503050406030204" pitchFamily="18" charset="0"/>
+                                </a:rPr>
+                              </m:ctrlPr>
+                            </m:mPr>
+                            <m:mr>
+                              <m:e>
+                                <m:r>
+                                  <m:rPr>
+                                    <m:brk m:alnAt="7"/>
+                                  </m:rPr>
+                                  <a:rPr lang="en-US" b="0" i="1" smtClean="0">
+                                    <a:latin typeface="Cambria Math" panose="02040503050406030204" pitchFamily="18" charset="0"/>
+                                  </a:rPr>
+                                  <m:t>1</m:t>
+                                </m:r>
+                              </m:e>
+                              <m:e>
+                                <m:r>
+                                  <a:rPr lang="en-DE" i="1" smtClean="0">
+                                    <a:latin typeface="Cambria Math" panose="02040503050406030204" pitchFamily="18" charset="0"/>
+                                  </a:rPr>
+                                  <m:t>⋯</m:t>
+                                </m:r>
+                              </m:e>
+                              <m:e>
+                                <m:r>
+                                  <a:rPr lang="en-US" b="0" i="1" smtClean="0">
+                                    <a:latin typeface="Cambria Math" panose="02040503050406030204" pitchFamily="18" charset="0"/>
+                                  </a:rPr>
+                                  <m:t>0</m:t>
+                                </m:r>
+                              </m:e>
+                            </m:mr>
+                            <m:mr>
+                              <m:e>
+                                <m:r>
+                                  <a:rPr lang="en-DE" i="1" smtClean="0">
+                                    <a:latin typeface="Cambria Math" panose="02040503050406030204" pitchFamily="18" charset="0"/>
+                                  </a:rPr>
+                                  <m:t>⋮</m:t>
+                                </m:r>
+                              </m:e>
+                              <m:e>
+                                <m:r>
+                                  <a:rPr lang="en-DE" i="1" smtClean="0">
+                                    <a:latin typeface="Cambria Math" panose="02040503050406030204" pitchFamily="18" charset="0"/>
+                                  </a:rPr>
+                                  <m:t>⋱</m:t>
+                                </m:r>
+                              </m:e>
+                              <m:e>
+                                <m:r>
+                                  <a:rPr lang="en-DE" i="1" smtClean="0">
+                                    <a:latin typeface="Cambria Math" panose="02040503050406030204" pitchFamily="18" charset="0"/>
+                                  </a:rPr>
+                                  <m:t>⋮</m:t>
+                                </m:r>
+                              </m:e>
+                            </m:mr>
+                            <m:mr>
+                              <m:e>
+                                <m:r>
+                                  <a:rPr lang="en-US" b="0" i="1" smtClean="0">
+                                    <a:latin typeface="Cambria Math" panose="02040503050406030204" pitchFamily="18" charset="0"/>
+                                  </a:rPr>
+                                  <m:t>0</m:t>
+                                </m:r>
+                              </m:e>
+                              <m:e>
+                                <m:r>
+                                  <a:rPr lang="en-DE" i="1" smtClean="0">
+                                    <a:latin typeface="Cambria Math" panose="02040503050406030204" pitchFamily="18" charset="0"/>
+                                  </a:rPr>
+                                  <m:t>⋯</m:t>
+                                </m:r>
+                              </m:e>
+                              <m:e>
+                                <m:r>
+                                  <a:rPr lang="en-US" b="0" i="1" smtClean="0">
+                                    <a:latin typeface="Cambria Math" panose="02040503050406030204" pitchFamily="18" charset="0"/>
+                                  </a:rPr>
+                                  <m:t>0</m:t>
+                                </m:r>
+                              </m:e>
+                            </m:mr>
+                          </m:m>
+                        </m:e>
+                      </m:d>
+                    </m:oMath>
+                  </m:oMathPara>
+                </a14:m>
+                <a:endParaRPr lang="en-DE" dirty="0"/>
+              </a:p>
+            </p:txBody>
+          </p:sp>
+        </mc:Choice>
+        <mc:Fallback>
+          <p:sp>
+            <p:nvSpPr>
+              <p:cNvPr id="10" name="TextBox 9">
+                <a:extLst>
+                  <a:ext uri="{FF2B5EF4-FFF2-40B4-BE49-F238E27FC236}">
+                    <a16:creationId xmlns:a16="http://schemas.microsoft.com/office/drawing/2014/main" id="{28C36B4C-18B2-29B8-1205-79A060B5F691}"/>
+                  </a:ext>
+                </a:extLst>
+              </p:cNvPr>
+              <p:cNvSpPr txBox="1">
+                <a:spLocks noRot="1" noChangeAspect="1" noMove="1" noResize="1" noEditPoints="1" noAdjustHandles="1" noChangeArrowheads="1" noChangeShapeType="1" noTextEdit="1"/>
+              </p:cNvSpPr>
+              <p:nvPr/>
+            </p:nvSpPr>
+            <p:spPr>
+              <a:xfrm>
+                <a:off x="962116" y="995975"/>
+                <a:ext cx="2056657" cy="732573"/>
+              </a:xfrm>
+              <a:prstGeom prst="rect">
+                <a:avLst/>
+              </a:prstGeom>
+              <a:blipFill>
+                <a:blip r:embed="rId3"/>
+                <a:stretch>
+                  <a:fillRect t="-1695" b="-8475"/>
+                </a:stretch>
+              </a:blipFill>
+            </p:spPr>
+            <p:txBody>
+              <a:bodyPr/>
+              <a:lstStyle/>
+              <a:p>
+                <a:r>
+                  <a:rPr lang="en-DE">
+                    <a:noFill/>
+                  </a:rPr>
+                  <a:t> </a:t>
+                </a:r>
+              </a:p>
+            </p:txBody>
+          </p:sp>
+        </mc:Fallback>
+      </mc:AlternateContent>
+      <p:sp>
+        <p:nvSpPr>
+          <p:cNvPr id="11" name="TextBox 10">
+            <a:extLst>
+              <a:ext uri="{FF2B5EF4-FFF2-40B4-BE49-F238E27FC236}">
+                <a16:creationId xmlns:a16="http://schemas.microsoft.com/office/drawing/2014/main" id="{6812D4D8-1C34-F95C-C3D5-5058E8C00B61}"/>
               </a:ext>
             </a:extLst>
           </p:cNvPr>
@@ -3755,7 +3891,7 @@
         </p:nvSpPr>
         <p:spPr>
           <a:xfrm>
-            <a:off x="1262741" y="4450923"/>
+            <a:off x="290484" y="118292"/>
             <a:ext cx="2873829" cy="369332"/>
           </a:xfrm>
           <a:prstGeom prst="rect">
@@ -3771,17 +3907,17 @@
           <a:p>
             <a:r>
               <a:rPr lang="en-DE" dirty="0"/>
-              <a:t>Output:</a:t>
-            </a:r>
-          </a:p>
-        </p:txBody>
-      </p:sp>
-      <p:sp>
-        <p:nvSpPr>
-          <p:cNvPr id="8" name="TextBox 7">
-            <a:extLst>
-              <a:ext uri="{FF2B5EF4-FFF2-40B4-BE49-F238E27FC236}">
-                <a16:creationId xmlns:a16="http://schemas.microsoft.com/office/drawing/2014/main" id="{C9BCBF26-5EFC-9620-B27F-13D7F1D6BF03}"/>
+              <a:t>10x peak count x cell matrix</a:t>
+            </a:r>
+          </a:p>
+        </p:txBody>
+      </p:sp>
+      <p:sp>
+        <p:nvSpPr>
+          <p:cNvPr id="12" name="TextBox 11">
+            <a:extLst>
+              <a:ext uri="{FF2B5EF4-FFF2-40B4-BE49-F238E27FC236}">
+                <a16:creationId xmlns:a16="http://schemas.microsoft.com/office/drawing/2014/main" id="{B40FEFD2-BBF0-3679-1175-D67896D457E0}"/>
               </a:ext>
             </a:extLst>
           </p:cNvPr>
@@ -3790,8 +3926,8 @@
         </p:nvSpPr>
         <p:spPr>
           <a:xfrm>
-            <a:off x="2710540" y="4427817"/>
-            <a:ext cx="4920345" cy="1477328"/>
+            <a:off x="1621223" y="518657"/>
+            <a:ext cx="929314" cy="369332"/>
           </a:xfrm>
           <a:prstGeom prst="rect">
             <a:avLst/>
@@ -3806,47 +3942,17 @@
           <a:p>
             <a:r>
               <a:rPr lang="en-DE" dirty="0"/>
-              <a:t>What do we want to predict? </a:t>
-            </a:r>
-          </a:p>
-          <a:p>
-            <a:endParaRPr lang="en-DE" dirty="0"/>
-          </a:p>
-          <a:p>
-            <a:pPr marL="285750" indent="-285750">
-              <a:buFont typeface="Wingdings" pitchFamily="2" charset="2"/>
-              <a:buChar char="è"/>
-            </a:pPr>
-            <a:r>
-              <a:rPr lang="en-DE" dirty="0"/>
-              <a:t>Tracks of scATAC </a:t>
-            </a:r>
-          </a:p>
-          <a:p>
-            <a:pPr marL="285750" indent="-285750">
-              <a:buFont typeface="Wingdings" pitchFamily="2" charset="2"/>
-              <a:buChar char="è"/>
-            </a:pPr>
-            <a:r>
-              <a:rPr lang="en-DE" dirty="0"/>
-              <a:t>Accesibible or not (binary)</a:t>
-            </a:r>
-          </a:p>
-          <a:p>
-            <a:pPr marL="285750" indent="-285750">
-              <a:buFont typeface="Wingdings" pitchFamily="2" charset="2"/>
-              <a:buChar char="è"/>
-            </a:pPr>
-            <a:endParaRPr lang="en-DE" dirty="0"/>
-          </a:p>
-        </p:txBody>
-      </p:sp>
-      <p:sp>
-        <p:nvSpPr>
-          <p:cNvPr id="9" name="TextBox 8">
-            <a:extLst>
-              <a:ext uri="{FF2B5EF4-FFF2-40B4-BE49-F238E27FC236}">
-                <a16:creationId xmlns:a16="http://schemas.microsoft.com/office/drawing/2014/main" id="{A8F09CB8-6F4E-051A-3638-9BD08CC0CA96}"/>
+              <a:t>Peaks</a:t>
+            </a:r>
+          </a:p>
+        </p:txBody>
+      </p:sp>
+      <p:sp>
+        <p:nvSpPr>
+          <p:cNvPr id="13" name="TextBox 12">
+            <a:extLst>
+              <a:ext uri="{FF2B5EF4-FFF2-40B4-BE49-F238E27FC236}">
+                <a16:creationId xmlns:a16="http://schemas.microsoft.com/office/drawing/2014/main" id="{E2D599E1-1D94-1A5E-45CA-2D57D120B050}"/>
               </a:ext>
             </a:extLst>
           </p:cNvPr>
@@ -3855,8 +3961,8 @@
         </p:nvSpPr>
         <p:spPr>
           <a:xfrm>
-            <a:off x="1210928" y="2709813"/>
-            <a:ext cx="2098964" cy="646331"/>
+            <a:off x="8946" y="995975"/>
+            <a:ext cx="1718453" cy="646331"/>
           </a:xfrm>
           <a:prstGeom prst="rect">
             <a:avLst/>
@@ -3871,8 +3977,924 @@
           <a:p>
             <a:r>
               <a:rPr lang="en-DE" dirty="0"/>
-              <a:t>+ Dataset token + cell type token + ?</a:t>
-            </a:r>
+              <a:t>Cells from all time points</a:t>
+            </a:r>
+          </a:p>
+        </p:txBody>
+      </p:sp>
+      <p:cxnSp>
+        <p:nvCxnSpPr>
+          <p:cNvPr id="15" name="Straight Arrow Connector 14">
+            <a:extLst>
+              <a:ext uri="{FF2B5EF4-FFF2-40B4-BE49-F238E27FC236}">
+                <a16:creationId xmlns:a16="http://schemas.microsoft.com/office/drawing/2014/main" id="{1426D1AE-572C-12C6-9F1A-13A2E0388A45}"/>
+              </a:ext>
+            </a:extLst>
+          </p:cNvPr>
+          <p:cNvCxnSpPr>
+            <a:cxnSpLocks/>
+          </p:cNvCxnSpPr>
+          <p:nvPr/>
+        </p:nvCxnSpPr>
+        <p:spPr>
+          <a:xfrm>
+            <a:off x="2710540" y="1319140"/>
+            <a:ext cx="1860267" cy="0"/>
+          </a:xfrm>
+          <a:prstGeom prst="straightConnector1">
+            <a:avLst/>
+          </a:prstGeom>
+          <a:ln>
+            <a:tailEnd type="triangle"/>
+          </a:ln>
+        </p:spPr>
+        <p:style>
+          <a:lnRef idx="3">
+            <a:schemeClr val="dk1"/>
+          </a:lnRef>
+          <a:fillRef idx="0">
+            <a:schemeClr val="dk1"/>
+          </a:fillRef>
+          <a:effectRef idx="2">
+            <a:schemeClr val="dk1"/>
+          </a:effectRef>
+          <a:fontRef idx="minor">
+            <a:schemeClr val="tx1"/>
+          </a:fontRef>
+        </p:style>
+      </p:cxnSp>
+      <mc:AlternateContent xmlns:mc="http://schemas.openxmlformats.org/markup-compatibility/2006">
+        <mc:Choice xmlns:a14="http://schemas.microsoft.com/office/drawing/2010/main" Requires="a14">
+          <p:sp>
+            <p:nvSpPr>
+              <p:cNvPr id="17" name="TextBox 16">
+                <a:extLst>
+                  <a:ext uri="{FF2B5EF4-FFF2-40B4-BE49-F238E27FC236}">
+                    <a16:creationId xmlns:a16="http://schemas.microsoft.com/office/drawing/2014/main" id="{96394894-37FE-120B-2A08-2DCB0DCCEBFF}"/>
+                  </a:ext>
+                </a:extLst>
+              </p:cNvPr>
+              <p:cNvSpPr txBox="1"/>
+              <p:nvPr/>
+            </p:nvSpPr>
+            <p:spPr>
+              <a:xfrm>
+                <a:off x="4342950" y="991040"/>
+                <a:ext cx="2056657" cy="756426"/>
+              </a:xfrm>
+              <a:prstGeom prst="rect">
+                <a:avLst/>
+              </a:prstGeom>
+              <a:noFill/>
+            </p:spPr>
+            <p:txBody>
+              <a:bodyPr wrap="square" lIns="0" tIns="0" rIns="0" bIns="0" rtlCol="0">
+                <a:spAutoFit/>
+              </a:bodyPr>
+              <a:lstStyle/>
+              <a:p>
+                <a14:m>
+                  <m:oMathPara xmlns:m="http://schemas.openxmlformats.org/officeDocument/2006/math">
+                    <m:oMathParaPr>
+                      <m:jc m:val="centerGroup"/>
+                    </m:oMathParaPr>
+                    <m:oMath xmlns:m="http://schemas.openxmlformats.org/officeDocument/2006/math">
+                      <m:d>
+                        <m:dPr>
+                          <m:begChr m:val="["/>
+                          <m:endChr m:val="]"/>
+                          <m:ctrlPr>
+                            <a:rPr lang="en-DE" i="1" smtClean="0">
+                              <a:latin typeface="Cambria Math" panose="02040503050406030204" pitchFamily="18" charset="0"/>
+                            </a:rPr>
+                          </m:ctrlPr>
+                        </m:dPr>
+                        <m:e>
+                          <m:m>
+                            <m:mPr>
+                              <m:mcs>
+                                <m:mc>
+                                  <m:mcPr>
+                                    <m:count m:val="3"/>
+                                    <m:mcJc m:val="center"/>
+                                  </m:mcPr>
+                                </m:mc>
+                              </m:mcs>
+                              <m:ctrlPr>
+                                <a:rPr lang="en-DE" i="1" smtClean="0">
+                                  <a:latin typeface="Cambria Math" panose="02040503050406030204" pitchFamily="18" charset="0"/>
+                                </a:rPr>
+                              </m:ctrlPr>
+                            </m:mPr>
+                            <m:mr>
+                              <m:e>
+                                <m:r>
+                                  <m:rPr>
+                                    <m:brk m:alnAt="7"/>
+                                  </m:rPr>
+                                  <a:rPr lang="en-US" b="0" i="1" smtClean="0">
+                                    <a:latin typeface="Cambria Math" panose="02040503050406030204" pitchFamily="18" charset="0"/>
+                                  </a:rPr>
+                                  <m:t>5</m:t>
+                                </m:r>
+                              </m:e>
+                              <m:e>
+                                <m:r>
+                                  <a:rPr lang="en-DE" i="1" smtClean="0">
+                                    <a:latin typeface="Cambria Math" panose="02040503050406030204" pitchFamily="18" charset="0"/>
+                                  </a:rPr>
+                                  <m:t>⋯</m:t>
+                                </m:r>
+                              </m:e>
+                              <m:e>
+                                <m:r>
+                                  <a:rPr lang="en-US" b="0" i="1" smtClean="0">
+                                    <a:latin typeface="Cambria Math" panose="02040503050406030204" pitchFamily="18" charset="0"/>
+                                  </a:rPr>
+                                  <m:t>0</m:t>
+                                </m:r>
+                              </m:e>
+                            </m:mr>
+                            <m:mr>
+                              <m:e>
+                                <m:r>
+                                  <a:rPr lang="en-DE" i="1" smtClean="0">
+                                    <a:latin typeface="Cambria Math" panose="02040503050406030204" pitchFamily="18" charset="0"/>
+                                  </a:rPr>
+                                  <m:t>⋮</m:t>
+                                </m:r>
+                              </m:e>
+                              <m:e>
+                                <m:r>
+                                  <a:rPr lang="en-DE" i="1" smtClean="0">
+                                    <a:latin typeface="Cambria Math" panose="02040503050406030204" pitchFamily="18" charset="0"/>
+                                  </a:rPr>
+                                  <m:t>⋱</m:t>
+                                </m:r>
+                              </m:e>
+                              <m:e>
+                                <m:r>
+                                  <a:rPr lang="en-DE" i="1" smtClean="0">
+                                    <a:latin typeface="Cambria Math" panose="02040503050406030204" pitchFamily="18" charset="0"/>
+                                  </a:rPr>
+                                  <m:t>⋮</m:t>
+                                </m:r>
+                              </m:e>
+                            </m:mr>
+                            <m:mr>
+                              <m:e>
+                                <m:r>
+                                  <a:rPr lang="en-US" b="0" i="1" smtClean="0">
+                                    <a:latin typeface="Cambria Math" panose="02040503050406030204" pitchFamily="18" charset="0"/>
+                                  </a:rPr>
+                                  <m:t>0</m:t>
+                                </m:r>
+                              </m:e>
+                              <m:e>
+                                <m:r>
+                                  <a:rPr lang="en-DE" i="1" smtClean="0">
+                                    <a:latin typeface="Cambria Math" panose="02040503050406030204" pitchFamily="18" charset="0"/>
+                                  </a:rPr>
+                                  <m:t>⋯</m:t>
+                                </m:r>
+                              </m:e>
+                              <m:e>
+                                <m:r>
+                                  <a:rPr lang="en-US" b="0" i="1" smtClean="0">
+                                    <a:latin typeface="Cambria Math" panose="02040503050406030204" pitchFamily="18" charset="0"/>
+                                  </a:rPr>
+                                  <m:t>1</m:t>
+                                </m:r>
+                              </m:e>
+                            </m:mr>
+                          </m:m>
+                        </m:e>
+                      </m:d>
+                    </m:oMath>
+                  </m:oMathPara>
+                </a14:m>
+                <a:endParaRPr lang="en-DE" dirty="0"/>
+              </a:p>
+            </p:txBody>
+          </p:sp>
+        </mc:Choice>
+        <mc:Fallback>
+          <p:sp>
+            <p:nvSpPr>
+              <p:cNvPr id="17" name="TextBox 16">
+                <a:extLst>
+                  <a:ext uri="{FF2B5EF4-FFF2-40B4-BE49-F238E27FC236}">
+                    <a16:creationId xmlns:a16="http://schemas.microsoft.com/office/drawing/2014/main" id="{96394894-37FE-120B-2A08-2DCB0DCCEBFF}"/>
+                  </a:ext>
+                </a:extLst>
+              </p:cNvPr>
+              <p:cNvSpPr txBox="1">
+                <a:spLocks noRot="1" noChangeAspect="1" noMove="1" noResize="1" noEditPoints="1" noAdjustHandles="1" noChangeArrowheads="1" noChangeShapeType="1" noTextEdit="1"/>
+              </p:cNvSpPr>
+              <p:nvPr/>
+            </p:nvSpPr>
+            <p:spPr>
+              <a:xfrm>
+                <a:off x="4342950" y="991040"/>
+                <a:ext cx="2056657" cy="756426"/>
+              </a:xfrm>
+              <a:prstGeom prst="rect">
+                <a:avLst/>
+              </a:prstGeom>
+              <a:blipFill>
+                <a:blip r:embed="rId4"/>
+                <a:stretch>
+                  <a:fillRect t="-3333" b="-6667"/>
+                </a:stretch>
+              </a:blipFill>
+            </p:spPr>
+            <p:txBody>
+              <a:bodyPr/>
+              <a:lstStyle/>
+              <a:p>
+                <a:r>
+                  <a:rPr lang="en-DE">
+                    <a:noFill/>
+                  </a:rPr>
+                  <a:t> </a:t>
+                </a:r>
+              </a:p>
+            </p:txBody>
+          </p:sp>
+        </mc:Fallback>
+      </mc:AlternateContent>
+      <p:sp>
+        <p:nvSpPr>
+          <p:cNvPr id="18" name="TextBox 17">
+            <a:extLst>
+              <a:ext uri="{FF2B5EF4-FFF2-40B4-BE49-F238E27FC236}">
+                <a16:creationId xmlns:a16="http://schemas.microsoft.com/office/drawing/2014/main" id="{8B4E516B-F0F0-5A63-2C41-F4C6C5F4B048}"/>
+              </a:ext>
+            </a:extLst>
+          </p:cNvPr>
+          <p:cNvSpPr txBox="1"/>
+          <p:nvPr/>
+        </p:nvSpPr>
+        <p:spPr>
+          <a:xfrm>
+            <a:off x="5020550" y="547536"/>
+            <a:ext cx="929314" cy="369332"/>
+          </a:xfrm>
+          <a:prstGeom prst="rect">
+            <a:avLst/>
+          </a:prstGeom>
+          <a:noFill/>
+        </p:spPr>
+        <p:txBody>
+          <a:bodyPr wrap="square" rtlCol="0">
+            <a:spAutoFit/>
+          </a:bodyPr>
+          <a:lstStyle/>
+          <a:p>
+            <a:r>
+              <a:rPr lang="en-DE" dirty="0"/>
+              <a:t>Peaks</a:t>
+            </a:r>
+          </a:p>
+        </p:txBody>
+      </p:sp>
+      <p:sp>
+        <p:nvSpPr>
+          <p:cNvPr id="19" name="TextBox 18">
+            <a:extLst>
+              <a:ext uri="{FF2B5EF4-FFF2-40B4-BE49-F238E27FC236}">
+                <a16:creationId xmlns:a16="http://schemas.microsoft.com/office/drawing/2014/main" id="{0F7A0982-9F28-A103-956F-1891B3CC56AD}"/>
+              </a:ext>
+            </a:extLst>
+          </p:cNvPr>
+          <p:cNvSpPr txBox="1"/>
+          <p:nvPr/>
+        </p:nvSpPr>
+        <p:spPr>
+          <a:xfrm>
+            <a:off x="2852354" y="574577"/>
+            <a:ext cx="1718453" cy="646331"/>
+          </a:xfrm>
+          <a:prstGeom prst="rect">
+            <a:avLst/>
+          </a:prstGeom>
+          <a:noFill/>
+        </p:spPr>
+        <p:txBody>
+          <a:bodyPr wrap="square" rtlCol="0">
+            <a:spAutoFit/>
+          </a:bodyPr>
+          <a:lstStyle/>
+          <a:p>
+            <a:r>
+              <a:rPr lang="en-DE" dirty="0"/>
+              <a:t>Pseudo bulk by time + cell type</a:t>
+            </a:r>
+          </a:p>
+        </p:txBody>
+      </p:sp>
+      <p:cxnSp>
+        <p:nvCxnSpPr>
+          <p:cNvPr id="24" name="Straight Arrow Connector 23">
+            <a:extLst>
+              <a:ext uri="{FF2B5EF4-FFF2-40B4-BE49-F238E27FC236}">
+                <a16:creationId xmlns:a16="http://schemas.microsoft.com/office/drawing/2014/main" id="{C33DEC7C-5492-C895-2BD4-2D5C1A613629}"/>
+              </a:ext>
+            </a:extLst>
+          </p:cNvPr>
+          <p:cNvCxnSpPr>
+            <a:cxnSpLocks/>
+          </p:cNvCxnSpPr>
+          <p:nvPr/>
+        </p:nvCxnSpPr>
+        <p:spPr>
+          <a:xfrm>
+            <a:off x="6112849" y="1346201"/>
+            <a:ext cx="538472" cy="0"/>
+          </a:xfrm>
+          <a:prstGeom prst="straightConnector1">
+            <a:avLst/>
+          </a:prstGeom>
+          <a:ln>
+            <a:tailEnd type="triangle"/>
+          </a:ln>
+        </p:spPr>
+        <p:style>
+          <a:lnRef idx="3">
+            <a:schemeClr val="dk1"/>
+          </a:lnRef>
+          <a:fillRef idx="0">
+            <a:schemeClr val="dk1"/>
+          </a:fillRef>
+          <a:effectRef idx="2">
+            <a:schemeClr val="dk1"/>
+          </a:effectRef>
+          <a:fontRef idx="minor">
+            <a:schemeClr val="tx1"/>
+          </a:fontRef>
+        </p:style>
+      </p:cxnSp>
+      <p:sp>
+        <p:nvSpPr>
+          <p:cNvPr id="25" name="TextBox 24">
+            <a:extLst>
+              <a:ext uri="{FF2B5EF4-FFF2-40B4-BE49-F238E27FC236}">
+                <a16:creationId xmlns:a16="http://schemas.microsoft.com/office/drawing/2014/main" id="{10708767-F44B-84B9-6034-F2C89B10614F}"/>
+              </a:ext>
+            </a:extLst>
+          </p:cNvPr>
+          <p:cNvSpPr txBox="1"/>
+          <p:nvPr/>
+        </p:nvSpPr>
+        <p:spPr>
+          <a:xfrm>
+            <a:off x="2964169" y="1388426"/>
+            <a:ext cx="1597922" cy="923330"/>
+          </a:xfrm>
+          <a:prstGeom prst="rect">
+            <a:avLst/>
+          </a:prstGeom>
+          <a:noFill/>
+        </p:spPr>
+        <p:txBody>
+          <a:bodyPr wrap="square" rtlCol="0">
+            <a:spAutoFit/>
+          </a:bodyPr>
+          <a:lstStyle/>
+          <a:p>
+            <a:r>
+              <a:rPr lang="en-DE" dirty="0">
+                <a:solidFill>
+                  <a:srgbClr val="FF0000"/>
+                </a:solidFill>
+              </a:rPr>
+              <a:t>Normalization to account for cell number ?</a:t>
+            </a:r>
+          </a:p>
+        </p:txBody>
+      </p:sp>
+      <p:sp>
+        <p:nvSpPr>
+          <p:cNvPr id="29" name="TextBox 28">
+            <a:extLst>
+              <a:ext uri="{FF2B5EF4-FFF2-40B4-BE49-F238E27FC236}">
+                <a16:creationId xmlns:a16="http://schemas.microsoft.com/office/drawing/2014/main" id="{8453E532-96C5-6A1F-94FF-66A2B6CE91D4}"/>
+              </a:ext>
+            </a:extLst>
+          </p:cNvPr>
+          <p:cNvSpPr txBox="1"/>
+          <p:nvPr/>
+        </p:nvSpPr>
+        <p:spPr>
+          <a:xfrm>
+            <a:off x="2964169" y="2508519"/>
+            <a:ext cx="2405615" cy="646331"/>
+          </a:xfrm>
+          <a:prstGeom prst="rect">
+            <a:avLst/>
+          </a:prstGeom>
+          <a:noFill/>
+        </p:spPr>
+        <p:txBody>
+          <a:bodyPr wrap="square" rtlCol="0">
+            <a:spAutoFit/>
+          </a:bodyPr>
+          <a:lstStyle/>
+          <a:p>
+            <a:r>
+              <a:rPr lang="en-US" dirty="0"/>
+              <a:t>Get sequence on reference genome </a:t>
+            </a:r>
+            <a:endParaRPr lang="en-DE" dirty="0"/>
+          </a:p>
+        </p:txBody>
+      </p:sp>
+      <p:sp>
+        <p:nvSpPr>
+          <p:cNvPr id="30" name="TextBox 29">
+            <a:extLst>
+              <a:ext uri="{FF2B5EF4-FFF2-40B4-BE49-F238E27FC236}">
+                <a16:creationId xmlns:a16="http://schemas.microsoft.com/office/drawing/2014/main" id="{CA78B0D8-1F6B-C0CC-9077-4B982F82644E}"/>
+              </a:ext>
+            </a:extLst>
+          </p:cNvPr>
+          <p:cNvSpPr txBox="1"/>
+          <p:nvPr/>
+        </p:nvSpPr>
+        <p:spPr>
+          <a:xfrm>
+            <a:off x="6232281" y="2781632"/>
+            <a:ext cx="2405615" cy="369332"/>
+          </a:xfrm>
+          <a:prstGeom prst="rect">
+            <a:avLst/>
+          </a:prstGeom>
+          <a:noFill/>
+        </p:spPr>
+        <p:txBody>
+          <a:bodyPr wrap="square" rtlCol="0">
+            <a:spAutoFit/>
+          </a:bodyPr>
+          <a:lstStyle/>
+          <a:p>
+            <a:r>
+              <a:rPr lang="en-US" dirty="0"/>
+              <a:t>One hot encode it </a:t>
+            </a:r>
+            <a:endParaRPr lang="en-DE" dirty="0"/>
+          </a:p>
+        </p:txBody>
+      </p:sp>
+      <p:cxnSp>
+        <p:nvCxnSpPr>
+          <p:cNvPr id="31" name="Straight Arrow Connector 30">
+            <a:extLst>
+              <a:ext uri="{FF2B5EF4-FFF2-40B4-BE49-F238E27FC236}">
+                <a16:creationId xmlns:a16="http://schemas.microsoft.com/office/drawing/2014/main" id="{9B4941F9-379C-88A3-BB06-807E3283B9CE}"/>
+              </a:ext>
+            </a:extLst>
+          </p:cNvPr>
+          <p:cNvCxnSpPr>
+            <a:cxnSpLocks/>
+          </p:cNvCxnSpPr>
+          <p:nvPr/>
+        </p:nvCxnSpPr>
+        <p:spPr>
+          <a:xfrm>
+            <a:off x="6263848" y="3258262"/>
+            <a:ext cx="1860267" cy="0"/>
+          </a:xfrm>
+          <a:prstGeom prst="straightConnector1">
+            <a:avLst/>
+          </a:prstGeom>
+          <a:ln>
+            <a:tailEnd type="triangle"/>
+          </a:ln>
+        </p:spPr>
+        <p:style>
+          <a:lnRef idx="3">
+            <a:schemeClr val="dk1"/>
+          </a:lnRef>
+          <a:fillRef idx="0">
+            <a:schemeClr val="dk1"/>
+          </a:fillRef>
+          <a:effectRef idx="2">
+            <a:schemeClr val="dk1"/>
+          </a:effectRef>
+          <a:fontRef idx="minor">
+            <a:schemeClr val="tx1"/>
+          </a:fontRef>
+        </p:style>
+      </p:cxnSp>
+      <p:sp>
+        <p:nvSpPr>
+          <p:cNvPr id="32" name="TextBox 31">
+            <a:extLst>
+              <a:ext uri="{FF2B5EF4-FFF2-40B4-BE49-F238E27FC236}">
+                <a16:creationId xmlns:a16="http://schemas.microsoft.com/office/drawing/2014/main" id="{8BFE0A41-93DD-2E64-61C5-2AA4204F3B0A}"/>
+              </a:ext>
+            </a:extLst>
+          </p:cNvPr>
+          <p:cNvSpPr txBox="1"/>
+          <p:nvPr/>
+        </p:nvSpPr>
+        <p:spPr>
+          <a:xfrm>
+            <a:off x="176719" y="3038869"/>
+            <a:ext cx="2532327" cy="369332"/>
+          </a:xfrm>
+          <a:prstGeom prst="rect">
+            <a:avLst/>
+          </a:prstGeom>
+          <a:noFill/>
+        </p:spPr>
+        <p:txBody>
+          <a:bodyPr wrap="square" rtlCol="0">
+            <a:spAutoFit/>
+          </a:bodyPr>
+          <a:lstStyle/>
+          <a:p>
+            <a:r>
+              <a:rPr lang="en-US" dirty="0"/>
+              <a:t>Chr 10: 902758- 902820</a:t>
+            </a:r>
+            <a:endParaRPr lang="en-DE" dirty="0"/>
+          </a:p>
+        </p:txBody>
+      </p:sp>
+      <p:cxnSp>
+        <p:nvCxnSpPr>
+          <p:cNvPr id="33" name="Straight Arrow Connector 32">
+            <a:extLst>
+              <a:ext uri="{FF2B5EF4-FFF2-40B4-BE49-F238E27FC236}">
+                <a16:creationId xmlns:a16="http://schemas.microsoft.com/office/drawing/2014/main" id="{E433FAF1-A79A-7C1C-370E-6E30210FF251}"/>
+              </a:ext>
+            </a:extLst>
+          </p:cNvPr>
+          <p:cNvCxnSpPr>
+            <a:cxnSpLocks/>
+          </p:cNvCxnSpPr>
+          <p:nvPr/>
+        </p:nvCxnSpPr>
+        <p:spPr>
+          <a:xfrm>
+            <a:off x="2992989" y="3250755"/>
+            <a:ext cx="1860267" cy="0"/>
+          </a:xfrm>
+          <a:prstGeom prst="straightConnector1">
+            <a:avLst/>
+          </a:prstGeom>
+          <a:ln>
+            <a:tailEnd type="triangle"/>
+          </a:ln>
+        </p:spPr>
+        <p:style>
+          <a:lnRef idx="3">
+            <a:schemeClr val="dk1"/>
+          </a:lnRef>
+          <a:fillRef idx="0">
+            <a:schemeClr val="dk1"/>
+          </a:fillRef>
+          <a:effectRef idx="2">
+            <a:schemeClr val="dk1"/>
+          </a:effectRef>
+          <a:fontRef idx="minor">
+            <a:schemeClr val="tx1"/>
+          </a:fontRef>
+        </p:style>
+      </p:cxnSp>
+      <p:sp>
+        <p:nvSpPr>
+          <p:cNvPr id="34" name="TextBox 33">
+            <a:extLst>
+              <a:ext uri="{FF2B5EF4-FFF2-40B4-BE49-F238E27FC236}">
+                <a16:creationId xmlns:a16="http://schemas.microsoft.com/office/drawing/2014/main" id="{F1C2AB30-6C4E-CF40-4A21-987EDB665495}"/>
+              </a:ext>
+            </a:extLst>
+          </p:cNvPr>
+          <p:cNvSpPr txBox="1"/>
+          <p:nvPr/>
+        </p:nvSpPr>
+        <p:spPr>
+          <a:xfrm>
+            <a:off x="2668406" y="3465352"/>
+            <a:ext cx="3818582" cy="1200329"/>
+          </a:xfrm>
+          <a:prstGeom prst="rect">
+            <a:avLst/>
+          </a:prstGeom>
+          <a:noFill/>
+        </p:spPr>
+        <p:txBody>
+          <a:bodyPr wrap="square" rtlCol="0">
+            <a:spAutoFit/>
+          </a:bodyPr>
+          <a:lstStyle/>
+          <a:p>
+            <a:r>
+              <a:rPr lang="en-US" dirty="0">
+                <a:solidFill>
+                  <a:srgbClr val="FF0000"/>
+                </a:solidFill>
+              </a:rPr>
+              <a:t>Which sequence do we use?</a:t>
+            </a:r>
+          </a:p>
+          <a:p>
+            <a:pPr marL="285750" indent="-285750">
+              <a:buFont typeface="Wingdings" pitchFamily="2" charset="2"/>
+              <a:buChar char="è"/>
+            </a:pPr>
+            <a:r>
+              <a:rPr lang="en-US" dirty="0"/>
+              <a:t>Exact peak</a:t>
+            </a:r>
+          </a:p>
+          <a:p>
+            <a:pPr marL="285750" indent="-285750">
+              <a:buFont typeface="Wingdings" pitchFamily="2" charset="2"/>
+              <a:buChar char="è"/>
+            </a:pPr>
+            <a:r>
+              <a:rPr lang="en-US" dirty="0"/>
+              <a:t>Peak with fixed number bp around</a:t>
+            </a:r>
+          </a:p>
+          <a:p>
+            <a:pPr marL="285750" indent="-285750">
+              <a:buFont typeface="Wingdings" pitchFamily="2" charset="2"/>
+              <a:buChar char="è"/>
+            </a:pPr>
+            <a:r>
+              <a:rPr lang="en-US" dirty="0"/>
+              <a:t>Exact length around center peak</a:t>
+            </a:r>
+          </a:p>
+        </p:txBody>
+      </p:sp>
+      <p:sp>
+        <p:nvSpPr>
+          <p:cNvPr id="36" name="TextBox 35">
+            <a:extLst>
+              <a:ext uri="{FF2B5EF4-FFF2-40B4-BE49-F238E27FC236}">
+                <a16:creationId xmlns:a16="http://schemas.microsoft.com/office/drawing/2014/main" id="{7C176929-B274-4F5A-2AB0-0B2BAC47985C}"/>
+              </a:ext>
+            </a:extLst>
+          </p:cNvPr>
+          <p:cNvSpPr txBox="1"/>
+          <p:nvPr/>
+        </p:nvSpPr>
+        <p:spPr>
+          <a:xfrm>
+            <a:off x="7705957" y="3993525"/>
+            <a:ext cx="3442950" cy="646331"/>
+          </a:xfrm>
+          <a:prstGeom prst="rect">
+            <a:avLst/>
+          </a:prstGeom>
+          <a:noFill/>
+        </p:spPr>
+        <p:txBody>
+          <a:bodyPr wrap="square" rtlCol="0">
+            <a:spAutoFit/>
+          </a:bodyPr>
+          <a:lstStyle/>
+          <a:p>
+            <a:r>
+              <a:rPr lang="en-US" dirty="0">
+                <a:solidFill>
+                  <a:srgbClr val="FF0000"/>
+                </a:solidFill>
+              </a:rPr>
+              <a:t>What to do with the N in the sequences?</a:t>
+            </a:r>
+          </a:p>
+        </p:txBody>
+      </p:sp>
+      <p:pic>
+        <p:nvPicPr>
+          <p:cNvPr id="37" name="Picture 36">
+            <a:extLst>
+              <a:ext uri="{FF2B5EF4-FFF2-40B4-BE49-F238E27FC236}">
+                <a16:creationId xmlns:a16="http://schemas.microsoft.com/office/drawing/2014/main" id="{7A940911-23A3-1124-C25B-CF078A9E0E73}"/>
+              </a:ext>
+            </a:extLst>
+          </p:cNvPr>
+          <p:cNvPicPr>
+            <a:picLocks noChangeAspect="1"/>
+          </p:cNvPicPr>
+          <p:nvPr/>
+        </p:nvPicPr>
+        <p:blipFill>
+          <a:blip r:embed="rId5"/>
+          <a:stretch>
+            <a:fillRect/>
+          </a:stretch>
+        </p:blipFill>
+        <p:spPr>
+          <a:xfrm>
+            <a:off x="7306126" y="242340"/>
+            <a:ext cx="3508889" cy="2330206"/>
+          </a:xfrm>
+          <a:prstGeom prst="rect">
+            <a:avLst/>
+          </a:prstGeom>
+        </p:spPr>
+      </p:pic>
+      <p:cxnSp>
+        <p:nvCxnSpPr>
+          <p:cNvPr id="39" name="Straight Arrow Connector 38">
+            <a:extLst>
+              <a:ext uri="{FF2B5EF4-FFF2-40B4-BE49-F238E27FC236}">
+                <a16:creationId xmlns:a16="http://schemas.microsoft.com/office/drawing/2014/main" id="{7D25E796-9430-BA90-1249-048F50AF6D45}"/>
+              </a:ext>
+            </a:extLst>
+          </p:cNvPr>
+          <p:cNvCxnSpPr/>
+          <p:nvPr/>
+        </p:nvCxnSpPr>
+        <p:spPr>
+          <a:xfrm>
+            <a:off x="9732723" y="2311756"/>
+            <a:ext cx="801666" cy="469876"/>
+          </a:xfrm>
+          <a:prstGeom prst="straightConnector1">
+            <a:avLst/>
+          </a:prstGeom>
+          <a:ln>
+            <a:tailEnd type="triangle"/>
+          </a:ln>
+        </p:spPr>
+        <p:style>
+          <a:lnRef idx="3">
+            <a:schemeClr val="accent2"/>
+          </a:lnRef>
+          <a:fillRef idx="0">
+            <a:schemeClr val="accent2"/>
+          </a:fillRef>
+          <a:effectRef idx="2">
+            <a:schemeClr val="accent2"/>
+          </a:effectRef>
+          <a:fontRef idx="minor">
+            <a:schemeClr val="tx1"/>
+          </a:fontRef>
+        </p:style>
+      </p:cxnSp>
+      <p:sp>
+        <p:nvSpPr>
+          <p:cNvPr id="40" name="TextBox 39">
+            <a:extLst>
+              <a:ext uri="{FF2B5EF4-FFF2-40B4-BE49-F238E27FC236}">
+                <a16:creationId xmlns:a16="http://schemas.microsoft.com/office/drawing/2014/main" id="{BF43FC52-1879-9EAB-A2E4-DB8BD656A5E2}"/>
+              </a:ext>
+            </a:extLst>
+          </p:cNvPr>
+          <p:cNvSpPr txBox="1"/>
+          <p:nvPr/>
+        </p:nvSpPr>
+        <p:spPr>
+          <a:xfrm>
+            <a:off x="10599835" y="2669537"/>
+            <a:ext cx="1738302" cy="923330"/>
+          </a:xfrm>
+          <a:prstGeom prst="rect">
+            <a:avLst/>
+          </a:prstGeom>
+          <a:noFill/>
+        </p:spPr>
+        <p:txBody>
+          <a:bodyPr wrap="square" rtlCol="0">
+            <a:spAutoFit/>
+          </a:bodyPr>
+          <a:lstStyle/>
+          <a:p>
+            <a:r>
+              <a:rPr lang="en-DE" dirty="0"/>
+              <a:t>Pseudo bulk ATAC read count</a:t>
+            </a:r>
+          </a:p>
+          <a:p>
+            <a:r>
+              <a:rPr lang="en-DE" dirty="0"/>
+              <a:t>-&gt; discrete</a:t>
+            </a:r>
+          </a:p>
+        </p:txBody>
+      </p:sp>
+      <p:sp>
+        <p:nvSpPr>
+          <p:cNvPr id="41" name="TextBox 40">
+            <a:extLst>
+              <a:ext uri="{FF2B5EF4-FFF2-40B4-BE49-F238E27FC236}">
+                <a16:creationId xmlns:a16="http://schemas.microsoft.com/office/drawing/2014/main" id="{15DF3F34-A618-FC78-9807-035D8256E199}"/>
+              </a:ext>
+            </a:extLst>
+          </p:cNvPr>
+          <p:cNvSpPr txBox="1"/>
+          <p:nvPr/>
+        </p:nvSpPr>
+        <p:spPr>
+          <a:xfrm>
+            <a:off x="290484" y="4891654"/>
+            <a:ext cx="4082335" cy="2031325"/>
+          </a:xfrm>
+          <a:prstGeom prst="rect">
+            <a:avLst/>
+          </a:prstGeom>
+          <a:noFill/>
+        </p:spPr>
+        <p:txBody>
+          <a:bodyPr wrap="square" rtlCol="0">
+            <a:spAutoFit/>
+          </a:bodyPr>
+          <a:lstStyle/>
+          <a:p>
+            <a:r>
+              <a:rPr lang="en-US" dirty="0">
+                <a:solidFill>
+                  <a:srgbClr val="FF0000"/>
+                </a:solidFill>
+              </a:rPr>
+              <a:t>Exclude sex chromosomes? </a:t>
+            </a:r>
+          </a:p>
+          <a:p>
+            <a:endParaRPr lang="en-US" dirty="0">
+              <a:solidFill>
+                <a:srgbClr val="FF0000"/>
+              </a:solidFill>
+            </a:endParaRPr>
+          </a:p>
+          <a:p>
+            <a:r>
+              <a:rPr lang="en-US" dirty="0">
+                <a:solidFill>
+                  <a:srgbClr val="FF0000"/>
+                </a:solidFill>
+              </a:rPr>
+              <a:t>Aggregate for some time + cell type -&gt; very few cells. Do still keep those pseudo bulk? Probably not enough cells to be good estimate of tracks</a:t>
+            </a:r>
+          </a:p>
+          <a:p>
+            <a:endParaRPr lang="en-US" dirty="0">
+              <a:solidFill>
+                <a:srgbClr val="FF0000"/>
+              </a:solidFill>
+            </a:endParaRPr>
+          </a:p>
+        </p:txBody>
+      </p:sp>
+      <p:sp>
+        <p:nvSpPr>
+          <p:cNvPr id="42" name="TextBox 41">
+            <a:extLst>
+              <a:ext uri="{FF2B5EF4-FFF2-40B4-BE49-F238E27FC236}">
+                <a16:creationId xmlns:a16="http://schemas.microsoft.com/office/drawing/2014/main" id="{52B405B1-70C1-43A7-38FE-57517608F61E}"/>
+              </a:ext>
+            </a:extLst>
+          </p:cNvPr>
+          <p:cNvSpPr txBox="1"/>
+          <p:nvPr/>
+        </p:nvSpPr>
+        <p:spPr>
+          <a:xfrm>
+            <a:off x="4844606" y="4872770"/>
+            <a:ext cx="4082335" cy="1477328"/>
+          </a:xfrm>
+          <a:prstGeom prst="rect">
+            <a:avLst/>
+          </a:prstGeom>
+          <a:noFill/>
+        </p:spPr>
+        <p:txBody>
+          <a:bodyPr wrap="square" rtlCol="0">
+            <a:spAutoFit/>
+          </a:bodyPr>
+          <a:lstStyle/>
+          <a:p>
+            <a:r>
+              <a:rPr lang="en-US">
+                <a:solidFill>
+                  <a:srgbClr val="FF0000"/>
+                </a:solidFill>
+              </a:rPr>
+              <a:t>Aggregate </a:t>
+            </a:r>
+            <a:r>
+              <a:rPr lang="en-US" dirty="0">
+                <a:solidFill>
+                  <a:srgbClr val="FF0000"/>
+                </a:solidFill>
+              </a:rPr>
+              <a:t>for some time + cell type -&gt; very few cells. Do still keep those pseudo bulk? Probably not enough cells to be good estimate of tracks</a:t>
+            </a:r>
+          </a:p>
+          <a:p>
+            <a:endParaRPr lang="en-US" dirty="0">
+              <a:solidFill>
+                <a:srgbClr val="FF0000"/>
+              </a:solidFill>
+            </a:endParaRPr>
           </a:p>
         </p:txBody>
       </p:sp>
@@ -3880,6 +4902,74 @@
     <p:extLst>
       <p:ext uri="{BB962C8B-B14F-4D97-AF65-F5344CB8AC3E}">
         <p14:creationId xmlns:p14="http://schemas.microsoft.com/office/powerpoint/2010/main" val="563429381"/>
+      </p:ext>
+    </p:extLst>
+  </p:cSld>
+  <p:clrMapOvr>
+    <a:masterClrMapping/>
+  </p:clrMapOvr>
+</p:sld>
+</file>
+
+<file path=ppt/slides/slide2.xml><?xml version="1.0" encoding="utf-8"?>
+<p:sld xmlns:a="http://schemas.openxmlformats.org/drawingml/2006/main" xmlns:r="http://schemas.openxmlformats.org/officeDocument/2006/relationships" xmlns:p="http://schemas.openxmlformats.org/presentationml/2006/main">
+  <p:cSld>
+    <p:spTree>
+      <p:nvGrpSpPr>
+        <p:cNvPr id="1" name=""/>
+        <p:cNvGrpSpPr/>
+        <p:nvPr/>
+      </p:nvGrpSpPr>
+      <p:grpSpPr>
+        <a:xfrm>
+          <a:off x="0" y="0"/>
+          <a:ext cx="0" cy="0"/>
+          <a:chOff x="0" y="0"/>
+          <a:chExt cx="0" cy="0"/>
+        </a:xfrm>
+      </p:grpSpPr>
+      <p:sp>
+        <p:nvSpPr>
+          <p:cNvPr id="4" name="TextBox 3">
+            <a:extLst>
+              <a:ext uri="{FF2B5EF4-FFF2-40B4-BE49-F238E27FC236}">
+                <a16:creationId xmlns:a16="http://schemas.microsoft.com/office/drawing/2014/main" id="{F0CDDAFA-E6FF-AD5B-FC69-69C4B4E68806}"/>
+              </a:ext>
+            </a:extLst>
+          </p:cNvPr>
+          <p:cNvSpPr txBox="1"/>
+          <p:nvPr/>
+        </p:nvSpPr>
+        <p:spPr>
+          <a:xfrm>
+            <a:off x="363408" y="211153"/>
+            <a:ext cx="4562772" cy="646331"/>
+          </a:xfrm>
+          <a:prstGeom prst="rect">
+            <a:avLst/>
+          </a:prstGeom>
+          <a:noFill/>
+        </p:spPr>
+        <p:txBody>
+          <a:bodyPr wrap="square" rtlCol="0">
+            <a:spAutoFit/>
+          </a:bodyPr>
+          <a:lstStyle/>
+          <a:p>
+            <a:r>
+              <a:rPr lang="en-DE" dirty="0"/>
+              <a:t>Get the countinous track with base resolution</a:t>
+            </a:r>
+          </a:p>
+          <a:p>
+            <a:endParaRPr lang="en-DE" dirty="0"/>
+          </a:p>
+        </p:txBody>
+      </p:sp>
+    </p:spTree>
+    <p:extLst>
+      <p:ext uri="{BB962C8B-B14F-4D97-AF65-F5344CB8AC3E}">
+        <p14:creationId xmlns:p14="http://schemas.microsoft.com/office/powerpoint/2010/main" val="1384667290"/>
       </p:ext>
     </p:extLst>
   </p:cSld>

</xml_diff>

<commit_message>
Add coverage distribution code
</commit_message>
<xml_diff>
--- a/notes/Building model.pptx
+++ b/notes/Building model.pptx
@@ -5,7 +5,7 @@
     <p:sldMasterId id="2147483648" r:id="rId1"/>
   </p:sldMasterIdLst>
   <p:notesMasterIdLst>
-    <p:notesMasterId r:id="rId9"/>
+    <p:notesMasterId r:id="rId10"/>
   </p:notesMasterIdLst>
   <p:sldIdLst>
     <p:sldId id="256" r:id="rId2"/>
@@ -14,7 +14,8 @@
     <p:sldId id="257" r:id="rId5"/>
     <p:sldId id="260" r:id="rId6"/>
     <p:sldId id="262" r:id="rId7"/>
-    <p:sldId id="261" r:id="rId8"/>
+    <p:sldId id="263" r:id="rId8"/>
+    <p:sldId id="261" r:id="rId9"/>
   </p:sldIdLst>
   <p:sldSz cx="12192000" cy="6858000"/>
   <p:notesSz cx="6858000" cy="9144000"/>
@@ -124,6 +125,7 @@
             <p14:sldId id="257"/>
             <p14:sldId id="260"/>
             <p14:sldId id="262"/>
+            <p14:sldId id="263"/>
             <p14:sldId id="261"/>
           </p14:sldIdLst>
         </p14:section>
@@ -705,6 +707,120 @@
     <p:extLst>
       <p:ext uri="{BB962C8B-B14F-4D97-AF65-F5344CB8AC3E}">
         <p14:creationId xmlns:p14="http://schemas.microsoft.com/office/powerpoint/2010/main" val="3177560551"/>
+      </p:ext>
+    </p:extLst>
+  </p:cSld>
+  <p:clrMapOvr>
+    <a:masterClrMapping/>
+  </p:clrMapOvr>
+</p:notes>
+</file>
+
+<file path=ppt/notesSlides/notesSlide3.xml><?xml version="1.0" encoding="utf-8"?>
+<p:notes xmlns:a="http://schemas.openxmlformats.org/drawingml/2006/main" xmlns:r="http://schemas.openxmlformats.org/officeDocument/2006/relationships" xmlns:p="http://schemas.openxmlformats.org/presentationml/2006/main">
+  <p:cSld>
+    <p:spTree>
+      <p:nvGrpSpPr>
+        <p:cNvPr id="1" name=""/>
+        <p:cNvGrpSpPr/>
+        <p:nvPr/>
+      </p:nvGrpSpPr>
+      <p:grpSpPr>
+        <a:xfrm>
+          <a:off x="0" y="0"/>
+          <a:ext cx="0" cy="0"/>
+          <a:chOff x="0" y="0"/>
+          <a:chExt cx="0" cy="0"/>
+        </a:xfrm>
+      </p:grpSpPr>
+      <p:sp>
+        <p:nvSpPr>
+          <p:cNvPr id="2" name="Slide Image Placeholder 1"/>
+          <p:cNvSpPr>
+            <a:spLocks noGrp="1" noRot="1" noChangeAspect="1"/>
+          </p:cNvSpPr>
+          <p:nvPr>
+            <p:ph type="sldImg"/>
+          </p:nvPr>
+        </p:nvSpPr>
+        <p:spPr/>
+      </p:sp>
+      <p:sp>
+        <p:nvSpPr>
+          <p:cNvPr id="3" name="Notes Placeholder 2"/>
+          <p:cNvSpPr>
+            <a:spLocks noGrp="1"/>
+          </p:cNvSpPr>
+          <p:nvPr>
+            <p:ph type="body" idx="1"/>
+          </p:nvPr>
+        </p:nvSpPr>
+        <p:spPr/>
+        <p:txBody>
+          <a:bodyPr/>
+          <a:lstStyle/>
+          <a:p>
+            <a:r>
+              <a:rPr lang="en-GB" dirty="0"/>
+              <a:t>https://</a:t>
+            </a:r>
+            <a:r>
+              <a:rPr lang="en-GB" dirty="0" err="1"/>
+              <a:t>github.com</a:t>
+            </a:r>
+            <a:r>
+              <a:rPr lang="en-GB" dirty="0"/>
+              <a:t>/</a:t>
+            </a:r>
+            <a:r>
+              <a:rPr lang="en-GB" dirty="0" err="1"/>
+              <a:t>kundajelab</a:t>
+            </a:r>
+            <a:r>
+              <a:rPr lang="en-GB" dirty="0"/>
+              <a:t>/</a:t>
+            </a:r>
+            <a:r>
+              <a:rPr lang="en-GB" dirty="0" err="1"/>
+              <a:t>chrombpnet</a:t>
+            </a:r>
+            <a:endParaRPr lang="en-GB" dirty="0"/>
+          </a:p>
+          <a:p>
+            <a:endParaRPr lang="en-GB" dirty="0"/>
+          </a:p>
+          <a:p>
+            <a:endParaRPr lang="en-DE" dirty="0"/>
+          </a:p>
+        </p:txBody>
+      </p:sp>
+      <p:sp>
+        <p:nvSpPr>
+          <p:cNvPr id="4" name="Slide Number Placeholder 3"/>
+          <p:cNvSpPr>
+            <a:spLocks noGrp="1"/>
+          </p:cNvSpPr>
+          <p:nvPr>
+            <p:ph type="sldNum" sz="quarter" idx="5"/>
+          </p:nvPr>
+        </p:nvSpPr>
+        <p:spPr/>
+        <p:txBody>
+          <a:bodyPr/>
+          <a:lstStyle/>
+          <a:p>
+            <a:fld id="{36981517-4442-DC41-AE00-02D7A55D9C50}" type="slidenum">
+              <a:rPr lang="en-DE" smtClean="0"/>
+              <a:t>7</a:t>
+            </a:fld>
+            <a:endParaRPr lang="en-DE"/>
+          </a:p>
+        </p:txBody>
+      </p:sp>
+    </p:spTree>
+    <p:extLst>
+      <p:ext uri="{BB962C8B-B14F-4D97-AF65-F5344CB8AC3E}">
+        <p14:creationId xmlns:p14="http://schemas.microsoft.com/office/powerpoint/2010/main" val="972503350"/>
       </p:ext>
     </p:extLst>
   </p:cSld>
@@ -5686,7 +5802,7 @@
         <p:spPr>
           <a:xfrm>
             <a:off x="3211276" y="3183882"/>
-            <a:ext cx="3818582" cy="646331"/>
+            <a:ext cx="3818582" cy="923330"/>
           </a:xfrm>
           <a:prstGeom prst="rect">
             <a:avLst/>
@@ -5715,7 +5831,7 @@
             </a:pPr>
             <a:r>
               <a:rPr lang="en-US" dirty="0"/>
-              <a:t>Exact length around center peak</a:t>
+              <a:t>Exact length around center peak  or max ?</a:t>
             </a:r>
           </a:p>
         </p:txBody>
@@ -5749,12 +5865,8 @@
           <a:lstStyle/>
           <a:p>
             <a:r>
-              <a:rPr lang="en-US" dirty="0">
-                <a:solidFill>
-                  <a:srgbClr val="FF0000"/>
-                </a:solidFill>
-              </a:rPr>
-              <a:t>What to do with the N in the sequences?</a:t>
+              <a:rPr lang="en-US" dirty="0"/>
+              <a:t>What to do with the N in the sequences? Remove them </a:t>
             </a:r>
           </a:p>
         </p:txBody>
@@ -5788,12 +5900,8 @@
           <a:lstStyle/>
           <a:p>
             <a:r>
-              <a:rPr lang="en-US" dirty="0">
-                <a:solidFill>
-                  <a:srgbClr val="FF0000"/>
-                </a:solidFill>
-              </a:rPr>
-              <a:t>Exclude sex chromosomes? </a:t>
+              <a:rPr lang="en-US" dirty="0"/>
+              <a:t>Keep sex chromosomes</a:t>
             </a:r>
           </a:p>
           <a:p>
@@ -5841,12 +5949,8 @@
           <a:lstStyle/>
           <a:p>
             <a:r>
-              <a:rPr lang="en-US" dirty="0">
-                <a:solidFill>
-                  <a:srgbClr val="FF0000"/>
-                </a:solidFill>
-              </a:rPr>
-              <a:t>Reference genome: hg38?</a:t>
+              <a:rPr lang="en-US" dirty="0"/>
+              <a:t>Reference genome: hg38</a:t>
             </a:r>
           </a:p>
           <a:p>
@@ -5930,12 +6034,8 @@
           <a:lstStyle/>
           <a:p>
             <a:r>
-              <a:rPr lang="en-US" dirty="0">
-                <a:solidFill>
-                  <a:srgbClr val="FF0000"/>
-                </a:solidFill>
-              </a:rPr>
-              <a:t>Do we use all peaks or the one differently accessible only?? General chromatin accessibly seems to be similar</a:t>
+              <a:rPr lang="en-US" dirty="0"/>
+              <a:t>Use all peaks for sequence + add GC content matched background regions</a:t>
             </a:r>
           </a:p>
           <a:p>
@@ -6021,7 +6121,7 @@
         </p:nvSpPr>
         <p:spPr>
           <a:xfrm>
-            <a:off x="3943174" y="3756369"/>
+            <a:off x="4118178" y="4099705"/>
             <a:ext cx="2555895" cy="646331"/>
           </a:xfrm>
           <a:prstGeom prst="rect">
@@ -6390,7 +6490,7 @@
         <p:spPr>
           <a:xfrm>
             <a:off x="774516" y="2647574"/>
-            <a:ext cx="4289574" cy="923330"/>
+            <a:ext cx="4289574" cy="646331"/>
           </a:xfrm>
           <a:prstGeom prst="rect">
             <a:avLst/>
@@ -6404,12 +6504,16 @@
           <a:lstStyle/>
           <a:p>
             <a:r>
-              <a:rPr lang="en-DE" dirty="0">
-                <a:solidFill>
-                  <a:srgbClr val="C00000"/>
-                </a:solidFill>
-              </a:rPr>
-              <a:t>In two paper they get values at each base by using a sliding window over the pseudo bulk number insertion of 200 bp.  </a:t>
+              <a:rPr lang="en-DE" dirty="0"/>
+              <a:t>U</a:t>
+            </a:r>
+            <a:r>
+              <a:rPr lang="en-GB" dirty="0"/>
+              <a:t>s</a:t>
+            </a:r>
+            <a:r>
+              <a:rPr lang="en-DE" dirty="0"/>
+              <a:t>e sliding window of 200 bp on .bw to get base resolution ATAC signal</a:t>
             </a:r>
           </a:p>
         </p:txBody>
@@ -7594,34 +7698,18 @@
           <a:lstStyle/>
           <a:p>
             <a:r>
-              <a:rPr lang="en-US" dirty="0">
-                <a:solidFill>
-                  <a:srgbClr val="C00000"/>
-                </a:solidFill>
-              </a:rPr>
+              <a:rPr lang="en-US" dirty="0"/>
               <a:t>Should we go bigger (</a:t>
             </a:r>
             <a:r>
-              <a:rPr lang="en-US" dirty="0" err="1">
-                <a:solidFill>
-                  <a:srgbClr val="C00000"/>
-                </a:solidFill>
-              </a:rPr>
+              <a:rPr lang="en-US" dirty="0" err="1"/>
               <a:t>ie</a:t>
             </a:r>
             <a:r>
-              <a:rPr lang="en-US" dirty="0">
-                <a:solidFill>
-                  <a:srgbClr val="C00000"/>
-                </a:solidFill>
-              </a:rPr>
-              <a:t> more parameters) since we need more capacity since modelling all cell types at once?</a:t>
-            </a:r>
-            <a:endParaRPr lang="en-DE" dirty="0">
-              <a:solidFill>
-                <a:srgbClr val="C00000"/>
-              </a:solidFill>
-            </a:endParaRPr>
+              <a:rPr lang="en-US" dirty="0"/>
+              <a:t> more parameters) since we need more capacity since modelling all cell types at once? Yes</a:t>
+            </a:r>
+            <a:endParaRPr lang="en-DE" dirty="0"/>
           </a:p>
         </p:txBody>
       </p:sp>
@@ -7701,51 +7789,27 @@
           <a:lstStyle/>
           <a:p>
             <a:r>
-              <a:rPr lang="en-US" dirty="0">
-                <a:solidFill>
-                  <a:srgbClr val="C00000"/>
-                </a:solidFill>
-              </a:rPr>
+              <a:rPr lang="en-US" dirty="0"/>
               <a:t>How to handle such large datasets? </a:t>
             </a:r>
           </a:p>
           <a:p>
-            <a:endParaRPr lang="en-US" dirty="0">
-              <a:solidFill>
-                <a:srgbClr val="C00000"/>
-              </a:solidFill>
-            </a:endParaRPr>
-          </a:p>
-          <a:p>
-            <a:r>
-              <a:rPr lang="en-US" dirty="0">
-                <a:solidFill>
-                  <a:srgbClr val="C00000"/>
-                </a:solidFill>
-              </a:rPr>
+            <a:endParaRPr lang="en-US" dirty="0"/>
+          </a:p>
+          <a:p>
+            <a:r>
+              <a:rPr lang="en-US" dirty="0"/>
               <a:t>Make sure </a:t>
             </a:r>
             <a:r>
-              <a:rPr lang="en-US" dirty="0" err="1">
-                <a:solidFill>
-                  <a:srgbClr val="C00000"/>
-                </a:solidFill>
-              </a:rPr>
+              <a:rPr lang="en-US" dirty="0" err="1"/>
               <a:t>dtype</a:t>
             </a:r>
             <a:r>
-              <a:rPr lang="en-US" dirty="0">
-                <a:solidFill>
-                  <a:srgbClr val="C00000"/>
-                </a:solidFill>
-              </a:rPr>
+              <a:rPr lang="en-US" dirty="0"/>
               <a:t> as efficient as possible</a:t>
             </a:r>
-            <a:endParaRPr lang="en-DE" dirty="0">
-              <a:solidFill>
-                <a:srgbClr val="C00000"/>
-              </a:solidFill>
-            </a:endParaRPr>
+            <a:endParaRPr lang="en-DE" dirty="0"/>
           </a:p>
         </p:txBody>
       </p:sp>
@@ -7803,7 +7867,7 @@
         <p:spPr>
           <a:xfrm>
             <a:off x="5841699" y="5092326"/>
-            <a:ext cx="2785366" cy="646331"/>
+            <a:ext cx="2785366" cy="923330"/>
           </a:xfrm>
           <a:prstGeom prst="rect">
             <a:avLst/>
@@ -7817,12 +7881,8 @@
           <a:lstStyle/>
           <a:p>
             <a:r>
-              <a:rPr lang="en-US" dirty="0">
-                <a:solidFill>
-                  <a:srgbClr val="C00000"/>
-                </a:solidFill>
-              </a:rPr>
-              <a:t>Where would you add the metadata?</a:t>
+              <a:rPr lang="en-US" dirty="0"/>
+              <a:t>Where would you add the metadata? After some convolutional layers</a:t>
             </a:r>
           </a:p>
         </p:txBody>
@@ -8004,10 +8064,10 @@
       </p:grpSpPr>
       <p:sp>
         <p:nvSpPr>
-          <p:cNvPr id="5" name="TextBox 4">
-            <a:extLst>
-              <a:ext uri="{FF2B5EF4-FFF2-40B4-BE49-F238E27FC236}">
-                <a16:creationId xmlns:a16="http://schemas.microsoft.com/office/drawing/2014/main" id="{8D8D59E7-94A6-E195-26A4-72F07D7C9E21}"/>
+          <p:cNvPr id="4" name="TextBox 3">
+            <a:extLst>
+              <a:ext uri="{FF2B5EF4-FFF2-40B4-BE49-F238E27FC236}">
+                <a16:creationId xmlns:a16="http://schemas.microsoft.com/office/drawing/2014/main" id="{F0CDDAFA-E6FF-AD5B-FC69-69C4B4E68806}"/>
               </a:ext>
             </a:extLst>
           </p:cNvPr>
@@ -8016,8 +8076,8 @@
         </p:nvSpPr>
         <p:spPr>
           <a:xfrm>
-            <a:off x="839243" y="663879"/>
-            <a:ext cx="6530236" cy="2862322"/>
+            <a:off x="890944" y="716009"/>
+            <a:ext cx="4562772" cy="1200329"/>
           </a:xfrm>
           <a:prstGeom prst="rect">
             <a:avLst/>
@@ -8032,7 +8092,453 @@
           <a:p>
             <a:r>
               <a:rPr lang="en-DE" dirty="0"/>
+              <a:t>Sequence N</a:t>
+            </a:r>
+          </a:p>
+          <a:p>
+            <a:r>
+              <a:rPr lang="en-DE" dirty="0"/>
+              <a:t>-&gt; 1027 sequences with N </a:t>
+            </a:r>
+          </a:p>
+          <a:p>
+            <a:r>
+              <a:rPr lang="en-DE" dirty="0"/>
+              <a:t>-&gt; Not that many </a:t>
+            </a:r>
+            <a:r>
+              <a:rPr lang="en-GB" dirty="0"/>
+              <a:t>d</a:t>
+            </a:r>
+            <a:r>
+              <a:rPr lang="en-DE" dirty="0"/>
+              <a:t>iscard them</a:t>
+            </a:r>
+          </a:p>
+          <a:p>
+            <a:endParaRPr lang="en-DE" dirty="0"/>
+          </a:p>
+        </p:txBody>
+      </p:sp>
+      <p:sp>
+        <p:nvSpPr>
+          <p:cNvPr id="3" name="TextBox 2">
+            <a:extLst>
+              <a:ext uri="{FF2B5EF4-FFF2-40B4-BE49-F238E27FC236}">
+                <a16:creationId xmlns:a16="http://schemas.microsoft.com/office/drawing/2014/main" id="{0D9DDC60-3DE8-4FF1-FDB2-6B634CFFD890}"/>
+              </a:ext>
+            </a:extLst>
+          </p:cNvPr>
+          <p:cNvSpPr txBox="1"/>
+          <p:nvPr/>
+        </p:nvSpPr>
+        <p:spPr>
+          <a:xfrm>
+            <a:off x="890944" y="2033329"/>
+            <a:ext cx="4562772" cy="923330"/>
+          </a:xfrm>
+          <a:prstGeom prst="rect">
+            <a:avLst/>
+          </a:prstGeom>
+          <a:noFill/>
+        </p:spPr>
+        <p:txBody>
+          <a:bodyPr wrap="square" rtlCol="0">
+            <a:spAutoFit/>
+          </a:bodyPr>
+          <a:lstStyle/>
+          <a:p>
+            <a:r>
+              <a:rPr lang="en-DE" dirty="0"/>
+              <a:t>Distribution of ATAC peak lengths</a:t>
+            </a:r>
+          </a:p>
+          <a:p>
+            <a:r>
+              <a:rPr lang="en-DE" dirty="0"/>
+              <a:t>-&gt; </a:t>
+            </a:r>
+            <a:r>
+              <a:rPr lang="en-GB" dirty="0"/>
+              <a:t>M</a:t>
+            </a:r>
+            <a:r>
+              <a:rPr lang="en-DE" dirty="0"/>
+              <a:t>edian 878</a:t>
+            </a:r>
+          </a:p>
+          <a:p>
+            <a:endParaRPr lang="en-DE" dirty="0"/>
+          </a:p>
+        </p:txBody>
+      </p:sp>
+      <p:pic>
+        <p:nvPicPr>
+          <p:cNvPr id="5" name="Picture 4">
+            <a:extLst>
+              <a:ext uri="{FF2B5EF4-FFF2-40B4-BE49-F238E27FC236}">
+                <a16:creationId xmlns:a16="http://schemas.microsoft.com/office/drawing/2014/main" id="{F7CCF239-0EC3-5C69-4723-6D7DD0F758BC}"/>
+              </a:ext>
+            </a:extLst>
+          </p:cNvPr>
+          <p:cNvPicPr>
+            <a:picLocks noChangeAspect="1"/>
+          </p:cNvPicPr>
+          <p:nvPr/>
+        </p:nvPicPr>
+        <p:blipFill>
+          <a:blip r:embed="rId3"/>
+          <a:stretch>
+            <a:fillRect/>
+          </a:stretch>
+        </p:blipFill>
+        <p:spPr>
+          <a:xfrm>
+            <a:off x="778614" y="2709624"/>
+            <a:ext cx="3670300" cy="2616200"/>
+          </a:xfrm>
+          <a:prstGeom prst="rect">
+            <a:avLst/>
+          </a:prstGeom>
+        </p:spPr>
+      </p:pic>
+      <p:sp>
+        <p:nvSpPr>
+          <p:cNvPr id="6" name="Rectangle 5">
+            <a:extLst>
+              <a:ext uri="{FF2B5EF4-FFF2-40B4-BE49-F238E27FC236}">
+                <a16:creationId xmlns:a16="http://schemas.microsoft.com/office/drawing/2014/main" id="{B88EC8C1-315D-EF5B-94CA-3C62167F81C1}"/>
+              </a:ext>
+            </a:extLst>
+          </p:cNvPr>
+          <p:cNvSpPr/>
+          <p:nvPr/>
+        </p:nvSpPr>
+        <p:spPr>
+          <a:xfrm flipV="1">
+            <a:off x="5453716" y="4033381"/>
+            <a:ext cx="1633277" cy="143024"/>
+          </a:xfrm>
+          <a:prstGeom prst="rect">
+            <a:avLst/>
+          </a:prstGeom>
+        </p:spPr>
+        <p:style>
+          <a:lnRef idx="2">
+            <a:schemeClr val="accent1">
+              <a:shade val="15000"/>
+            </a:schemeClr>
+          </a:lnRef>
+          <a:fillRef idx="1">
+            <a:schemeClr val="accent1"/>
+          </a:fillRef>
+          <a:effectRef idx="0">
+            <a:schemeClr val="accent1"/>
+          </a:effectRef>
+          <a:fontRef idx="minor">
+            <a:schemeClr val="lt1"/>
+          </a:fontRef>
+        </p:style>
+        <p:txBody>
+          <a:bodyPr rtlCol="0" anchor="ctr"/>
+          <a:lstStyle/>
+          <a:p>
+            <a:pPr algn="ctr"/>
+            <a:endParaRPr lang="en-DE"/>
+          </a:p>
+        </p:txBody>
+      </p:sp>
+      <p:sp>
+        <p:nvSpPr>
+          <p:cNvPr id="7" name="TextBox 6">
+            <a:extLst>
+              <a:ext uri="{FF2B5EF4-FFF2-40B4-BE49-F238E27FC236}">
+                <a16:creationId xmlns:a16="http://schemas.microsoft.com/office/drawing/2014/main" id="{29A27088-FC8E-081F-6B73-8C0515670120}"/>
+              </a:ext>
+            </a:extLst>
+          </p:cNvPr>
+          <p:cNvSpPr txBox="1"/>
+          <p:nvPr/>
+        </p:nvSpPr>
+        <p:spPr>
+          <a:xfrm>
+            <a:off x="5987441" y="3530074"/>
+            <a:ext cx="4562772" cy="646331"/>
+          </a:xfrm>
+          <a:prstGeom prst="rect">
+            <a:avLst/>
+          </a:prstGeom>
+          <a:noFill/>
+        </p:spPr>
+        <p:txBody>
+          <a:bodyPr wrap="square" rtlCol="0">
+            <a:spAutoFit/>
+          </a:bodyPr>
+          <a:lstStyle/>
+          <a:p>
+            <a:r>
+              <a:rPr lang="en-US" dirty="0"/>
+              <a:t>Peak</a:t>
+            </a:r>
+            <a:endParaRPr lang="en-DE" dirty="0"/>
+          </a:p>
+          <a:p>
+            <a:endParaRPr lang="en-DE" dirty="0"/>
+          </a:p>
+        </p:txBody>
+      </p:sp>
+      <p:cxnSp>
+        <p:nvCxnSpPr>
+          <p:cNvPr id="9" name="Straight Connector 8">
+            <a:extLst>
+              <a:ext uri="{FF2B5EF4-FFF2-40B4-BE49-F238E27FC236}">
+                <a16:creationId xmlns:a16="http://schemas.microsoft.com/office/drawing/2014/main" id="{A1D4F15B-5E22-2192-AFD1-52486BC0786F}"/>
+              </a:ext>
+            </a:extLst>
+          </p:cNvPr>
+          <p:cNvCxnSpPr/>
+          <p:nvPr/>
+        </p:nvCxnSpPr>
+        <p:spPr>
+          <a:xfrm>
+            <a:off x="6270354" y="4017724"/>
+            <a:ext cx="0" cy="341334"/>
+          </a:xfrm>
+          <a:prstGeom prst="line">
+            <a:avLst/>
+          </a:prstGeom>
+        </p:spPr>
+        <p:style>
+          <a:lnRef idx="3">
+            <a:schemeClr val="dk1"/>
+          </a:lnRef>
+          <a:fillRef idx="0">
+            <a:schemeClr val="dk1"/>
+          </a:fillRef>
+          <a:effectRef idx="2">
+            <a:schemeClr val="dk1"/>
+          </a:effectRef>
+          <a:fontRef idx="minor">
+            <a:schemeClr val="tx1"/>
+          </a:fontRef>
+        </p:style>
+      </p:cxnSp>
+      <p:cxnSp>
+        <p:nvCxnSpPr>
+          <p:cNvPr id="11" name="Straight Connector 10">
+            <a:extLst>
+              <a:ext uri="{FF2B5EF4-FFF2-40B4-BE49-F238E27FC236}">
+                <a16:creationId xmlns:a16="http://schemas.microsoft.com/office/drawing/2014/main" id="{F6AB1768-A34F-E3C2-2003-0AB75FF1AA04}"/>
+              </a:ext>
+            </a:extLst>
+          </p:cNvPr>
+          <p:cNvCxnSpPr/>
+          <p:nvPr/>
+        </p:nvCxnSpPr>
+        <p:spPr>
+          <a:xfrm>
+            <a:off x="5148197" y="4359058"/>
+            <a:ext cx="2242159" cy="0"/>
+          </a:xfrm>
+          <a:prstGeom prst="line">
+            <a:avLst/>
+          </a:prstGeom>
+        </p:spPr>
+        <p:style>
+          <a:lnRef idx="3">
+            <a:schemeClr val="dk1"/>
+          </a:lnRef>
+          <a:fillRef idx="0">
+            <a:schemeClr val="dk1"/>
+          </a:fillRef>
+          <a:effectRef idx="2">
+            <a:schemeClr val="dk1"/>
+          </a:effectRef>
+          <a:fontRef idx="minor">
+            <a:schemeClr val="tx1"/>
+          </a:fontRef>
+        </p:style>
+      </p:cxnSp>
+      <p:cxnSp>
+        <p:nvCxnSpPr>
+          <p:cNvPr id="13" name="Straight Connector 12">
+            <a:extLst>
+              <a:ext uri="{FF2B5EF4-FFF2-40B4-BE49-F238E27FC236}">
+                <a16:creationId xmlns:a16="http://schemas.microsoft.com/office/drawing/2014/main" id="{6EA7D73F-5887-AFE8-1AB1-03AE6BB1474E}"/>
+              </a:ext>
+            </a:extLst>
+          </p:cNvPr>
+          <p:cNvCxnSpPr/>
+          <p:nvPr/>
+        </p:nvCxnSpPr>
+        <p:spPr>
+          <a:xfrm>
+            <a:off x="5148197" y="4188391"/>
+            <a:ext cx="0" cy="170667"/>
+          </a:xfrm>
+          <a:prstGeom prst="line">
+            <a:avLst/>
+          </a:prstGeom>
+        </p:spPr>
+        <p:style>
+          <a:lnRef idx="3">
+            <a:schemeClr val="dk1"/>
+          </a:lnRef>
+          <a:fillRef idx="0">
+            <a:schemeClr val="dk1"/>
+          </a:fillRef>
+          <a:effectRef idx="2">
+            <a:schemeClr val="dk1"/>
+          </a:effectRef>
+          <a:fontRef idx="minor">
+            <a:schemeClr val="tx1"/>
+          </a:fontRef>
+        </p:style>
+      </p:cxnSp>
+      <p:cxnSp>
+        <p:nvCxnSpPr>
+          <p:cNvPr id="14" name="Straight Connector 13">
+            <a:extLst>
+              <a:ext uri="{FF2B5EF4-FFF2-40B4-BE49-F238E27FC236}">
+                <a16:creationId xmlns:a16="http://schemas.microsoft.com/office/drawing/2014/main" id="{E24181C9-B7AA-F3A3-245C-41E48C0C7F74}"/>
+              </a:ext>
+            </a:extLst>
+          </p:cNvPr>
+          <p:cNvCxnSpPr>
+            <a:cxnSpLocks/>
+          </p:cNvCxnSpPr>
+          <p:nvPr/>
+        </p:nvCxnSpPr>
+        <p:spPr>
+          <a:xfrm>
+            <a:off x="7390356" y="4104893"/>
+            <a:ext cx="0" cy="298789"/>
+          </a:xfrm>
+          <a:prstGeom prst="line">
+            <a:avLst/>
+          </a:prstGeom>
+        </p:spPr>
+        <p:style>
+          <a:lnRef idx="3">
+            <a:schemeClr val="dk1"/>
+          </a:lnRef>
+          <a:fillRef idx="0">
+            <a:schemeClr val="dk1"/>
+          </a:fillRef>
+          <a:effectRef idx="2">
+            <a:schemeClr val="dk1"/>
+          </a:effectRef>
+          <a:fontRef idx="minor">
+            <a:schemeClr val="tx1"/>
+          </a:fontRef>
+        </p:style>
+      </p:cxnSp>
+      <p:sp>
+        <p:nvSpPr>
+          <p:cNvPr id="20" name="TextBox 19">
+            <a:extLst>
+              <a:ext uri="{FF2B5EF4-FFF2-40B4-BE49-F238E27FC236}">
+                <a16:creationId xmlns:a16="http://schemas.microsoft.com/office/drawing/2014/main" id="{EA08FAAA-9F97-A6A9-1E68-ABAE77B7E884}"/>
+              </a:ext>
+            </a:extLst>
+          </p:cNvPr>
+          <p:cNvSpPr txBox="1"/>
+          <p:nvPr/>
+        </p:nvSpPr>
+        <p:spPr>
+          <a:xfrm>
+            <a:off x="6096000" y="4403682"/>
+            <a:ext cx="4562772" cy="646331"/>
+          </a:xfrm>
+          <a:prstGeom prst="rect">
+            <a:avLst/>
+          </a:prstGeom>
+          <a:noFill/>
+        </p:spPr>
+        <p:txBody>
+          <a:bodyPr wrap="square" rtlCol="0">
+            <a:spAutoFit/>
+          </a:bodyPr>
+          <a:lstStyle/>
+          <a:p>
+            <a:r>
+              <a:rPr lang="en-US" dirty="0"/>
+              <a:t>N = 2114, predict for smaller sequence (1000) </a:t>
+            </a:r>
+            <a:endParaRPr lang="en-DE" dirty="0"/>
+          </a:p>
+          <a:p>
+            <a:endParaRPr lang="en-DE" dirty="0"/>
+          </a:p>
+        </p:txBody>
+      </p:sp>
+    </p:spTree>
+    <p:extLst>
+      <p:ext uri="{BB962C8B-B14F-4D97-AF65-F5344CB8AC3E}">
+        <p14:creationId xmlns:p14="http://schemas.microsoft.com/office/powerpoint/2010/main" val="2661355659"/>
+      </p:ext>
+    </p:extLst>
+  </p:cSld>
+  <p:clrMapOvr>
+    <a:masterClrMapping/>
+  </p:clrMapOvr>
+</p:sld>
+</file>
+
+<file path=ppt/slides/slide8.xml><?xml version="1.0" encoding="utf-8"?>
+<p:sld xmlns:a="http://schemas.openxmlformats.org/drawingml/2006/main" xmlns:r="http://schemas.openxmlformats.org/officeDocument/2006/relationships" xmlns:p="http://schemas.openxmlformats.org/presentationml/2006/main">
+  <p:cSld>
+    <p:spTree>
+      <p:nvGrpSpPr>
+        <p:cNvPr id="1" name=""/>
+        <p:cNvGrpSpPr/>
+        <p:nvPr/>
+      </p:nvGrpSpPr>
+      <p:grpSpPr>
+        <a:xfrm>
+          <a:off x="0" y="0"/>
+          <a:ext cx="0" cy="0"/>
+          <a:chOff x="0" y="0"/>
+          <a:chExt cx="0" cy="0"/>
+        </a:xfrm>
+      </p:grpSpPr>
+      <p:sp>
+        <p:nvSpPr>
+          <p:cNvPr id="5" name="TextBox 4">
+            <a:extLst>
+              <a:ext uri="{FF2B5EF4-FFF2-40B4-BE49-F238E27FC236}">
+                <a16:creationId xmlns:a16="http://schemas.microsoft.com/office/drawing/2014/main" id="{8D8D59E7-94A6-E195-26A4-72F07D7C9E21}"/>
+              </a:ext>
+            </a:extLst>
+          </p:cNvPr>
+          <p:cNvSpPr txBox="1"/>
+          <p:nvPr/>
+        </p:nvSpPr>
+        <p:spPr>
+          <a:xfrm>
+            <a:off x="839243" y="663879"/>
+            <a:ext cx="6530236" cy="2862322"/>
+          </a:xfrm>
+          <a:prstGeom prst="rect">
+            <a:avLst/>
+          </a:prstGeom>
+          <a:noFill/>
+        </p:spPr>
+        <p:txBody>
+          <a:bodyPr wrap="square" rtlCol="0">
+            <a:spAutoFit/>
+          </a:bodyPr>
+          <a:lstStyle/>
+          <a:p>
+            <a:r>
+              <a:rPr lang="en-DE" dirty="0"/>
               <a:t>Write BPNet architechture</a:t>
+            </a:r>
+          </a:p>
+          <a:p>
+            <a:r>
+              <a:rPr lang="en-DE" dirty="0"/>
+              <a:t>Write model architechture</a:t>
             </a:r>
           </a:p>
           <a:p>
@@ -8064,13 +8570,6 @@
               <a:rPr lang="en-DE" dirty="0"/>
               <a:t>Compute coverage/deapth</a:t>
             </a:r>
-          </a:p>
-          <a:p>
-            <a:r>
-              <a:rPr lang="en-DE"/>
-              <a:t>Compute peak length</a:t>
-            </a:r>
-            <a:endParaRPr lang="en-DE" dirty="0"/>
           </a:p>
           <a:p>
             <a:endParaRPr lang="en-DE" dirty="0"/>

</xml_diff>